<commit_message>
Updates from accessibility check to WDS
</commit_message>
<xml_diff>
--- a/Whiteboard design session/WDS trainer presentation - Optimized architecture.pptx
+++ b/Whiteboard design session/WDS trainer presentation - Optimized architecture.pptx
@@ -3475,7 +3475,7 @@
                   <a:prstClr val="black"/>
                 </a:solidFill>
               </a:rPr>
-              <a:t>27-Dec-18 9:20 AM</a:t>
+              <a:t>27-Dec-18 3:07 PM</a:t>
             </a:fld>
             <a:endParaRPr lang="en-US" dirty="0">
               <a:solidFill>
@@ -18958,245 +18958,6 @@
           </a:p>
         </p:txBody>
       </p:sp>
-      <p:sp>
-        <p:nvSpPr>
-          <p:cNvPr id="5" name="Rectangle 1">
-            <a:extLst>
-              <a:ext uri="{FF2B5EF4-FFF2-40B4-BE49-F238E27FC236}">
-                <a16:creationId xmlns:a16="http://schemas.microsoft.com/office/drawing/2014/main" id="{B2F351FC-6B91-437D-8B5D-A5FDA233EDE5}"/>
-              </a:ext>
-            </a:extLst>
-          </p:cNvPr>
-          <p:cNvSpPr>
-            <a:spLocks noChangeArrowheads="1"/>
-          </p:cNvSpPr>
-          <p:nvPr/>
-        </p:nvSpPr>
-        <p:spPr bwMode="auto">
-          <a:xfrm>
-            <a:off x="690114" y="5131901"/>
-            <a:ext cx="9445086" cy="1523494"/>
-          </a:xfrm>
-          <a:prstGeom prst="rect">
-            <a:avLst/>
-          </a:prstGeom>
-          <a:noFill/>
-          <a:ln>
-            <a:noFill/>
-          </a:ln>
-          <a:effectLst/>
-          <a:extLst>
-            <a:ext uri="{909E8E84-426E-40DD-AFC4-6F175D3DCCD1}">
-              <a14:hiddenFill xmlns:a14="http://schemas.microsoft.com/office/drawing/2010/main">
-                <a:solidFill>
-                  <a:schemeClr val="accent1"/>
-                </a:solidFill>
-              </a14:hiddenFill>
-            </a:ext>
-            <a:ext uri="{91240B29-F687-4F45-9708-019B960494DF}">
-              <a14:hiddenLine xmlns:a14="http://schemas.microsoft.com/office/drawing/2010/main" w="9525">
-                <a:solidFill>
-                  <a:schemeClr val="tx1"/>
-                </a:solidFill>
-                <a:miter lim="800000"/>
-                <a:headEnd/>
-                <a:tailEnd/>
-              </a14:hiddenLine>
-            </a:ext>
-            <a:ext uri="{AF507438-7753-43E0-B8FC-AC1667EBCBE1}">
-              <a14:hiddenEffects xmlns:a14="http://schemas.microsoft.com/office/drawing/2010/main">
-                <a:effectLst>
-                  <a:outerShdw dist="35921" dir="2700000" algn="ctr" rotWithShape="0">
-                    <a:schemeClr val="bg2"/>
-                  </a:outerShdw>
-                </a:effectLst>
-              </a14:hiddenEffects>
-            </a:ext>
-          </a:extLst>
-        </p:spPr>
-        <p:txBody>
-          <a:bodyPr vert="horz" wrap="none" lIns="91440" tIns="45720" rIns="91440" bIns="45720" numCol="1" anchor="ctr" anchorCtr="0" compatLnSpc="1">
-            <a:prstTxWarp prst="textNoShape">
-              <a:avLst/>
-            </a:prstTxWarp>
-            <a:spAutoFit/>
-          </a:bodyPr>
-          <a:lstStyle/>
-          <a:p>
-            <a:pPr eaLnBrk="0" fontAlgn="base" hangingPunct="0">
-              <a:spcBef>
-                <a:spcPct val="0"/>
-              </a:spcBef>
-              <a:spcAft>
-                <a:spcPct val="0"/>
-              </a:spcAft>
-            </a:pPr>
-            <a:r>
-              <a:rPr lang="en-US" altLang="en-US" dirty="0">
-                <a:latin typeface="Segoe UI" panose="020B0502040204020203" pitchFamily="34" charset="0"/>
-                <a:cs typeface="Segoe UI" panose="020B0502040204020203" pitchFamily="34" charset="0"/>
-              </a:rPr>
-              <a:t>Existing Architecture (Current) Monthly Cost: $6,902</a:t>
-            </a:r>
-            <a:endParaRPr lang="en-US" altLang="en-US" dirty="0">
-              <a:latin typeface="Arial" panose="020B0604020202020204" pitchFamily="34" charset="0"/>
-            </a:endParaRPr>
-          </a:p>
-          <a:p>
-            <a:pPr marL="0" marR="0" lvl="0" indent="0" algn="l" defTabSz="914400" rtl="0" eaLnBrk="0" fontAlgn="base" latinLnBrk="0" hangingPunct="0">
-              <a:lnSpc>
-                <a:spcPct val="100000"/>
-              </a:lnSpc>
-              <a:spcBef>
-                <a:spcPct val="0"/>
-              </a:spcBef>
-              <a:spcAft>
-                <a:spcPct val="0"/>
-              </a:spcAft>
-              <a:buClrTx/>
-              <a:buSzTx/>
-              <a:buFontTx/>
-              <a:buNone/>
-              <a:tabLst/>
-            </a:pPr>
-            <a:r>
-              <a:rPr kumimoji="0" lang="en-US" altLang="en-US" sz="2800" b="0" i="0" u="none" strike="noStrike" cap="none" normalizeH="0" baseline="0" dirty="0">
-                <a:ln>
-                  <a:noFill/>
-                </a:ln>
-                <a:effectLst/>
-                <a:latin typeface="Segoe UI" panose="020B0502040204020203" pitchFamily="34" charset="0"/>
-                <a:ea typeface="Calibri" panose="020F0502020204030204" pitchFamily="34" charset="0"/>
-                <a:cs typeface="Segoe UI" panose="020B0502040204020203" pitchFamily="34" charset="0"/>
-              </a:rPr>
-              <a:t>Total Monthly Savings over Existing Architecture: </a:t>
-            </a:r>
-            <a:r>
-              <a:rPr kumimoji="0" lang="en-US" altLang="en-US" sz="2800" b="1" i="0" u="none" strike="noStrike" cap="none" normalizeH="0" baseline="0" dirty="0">
-                <a:ln>
-                  <a:noFill/>
-                </a:ln>
-                <a:effectLst/>
-                <a:latin typeface="Segoe UI" panose="020B0502040204020203" pitchFamily="34" charset="0"/>
-                <a:ea typeface="Calibri" panose="020F0502020204030204" pitchFamily="34" charset="0"/>
-                <a:cs typeface="Segoe UI" panose="020B0502040204020203" pitchFamily="34" charset="0"/>
-              </a:rPr>
-              <a:t>$3</a:t>
-            </a:r>
-            <a:r>
-              <a:rPr lang="en-US" altLang="en-US" sz="2800" b="1" dirty="0">
-                <a:latin typeface="Segoe UI" panose="020B0502040204020203" pitchFamily="34" charset="0"/>
-                <a:ea typeface="Calibri" panose="020F0502020204030204" pitchFamily="34" charset="0"/>
-                <a:cs typeface="Segoe UI" panose="020B0502040204020203" pitchFamily="34" charset="0"/>
-              </a:rPr>
-              <a:t>,392</a:t>
-            </a:r>
-            <a:endParaRPr kumimoji="0" lang="en-US" altLang="en-US" sz="2800" b="1" i="0" u="none" strike="noStrike" cap="none" normalizeH="0" baseline="0" dirty="0">
-              <a:ln>
-                <a:noFill/>
-              </a:ln>
-              <a:effectLst/>
-              <a:latin typeface="Segoe UI" panose="020B0502040204020203" pitchFamily="34" charset="0"/>
-              <a:ea typeface="Calibri" panose="020F0502020204030204" pitchFamily="34" charset="0"/>
-              <a:cs typeface="Segoe UI" panose="020B0502040204020203" pitchFamily="34" charset="0"/>
-            </a:endParaRPr>
-          </a:p>
-          <a:p>
-            <a:pPr marL="0" marR="0" lvl="0" indent="0" algn="l" defTabSz="914400" rtl="0" eaLnBrk="0" fontAlgn="base" latinLnBrk="0" hangingPunct="0">
-              <a:lnSpc>
-                <a:spcPct val="100000"/>
-              </a:lnSpc>
-              <a:spcBef>
-                <a:spcPct val="0"/>
-              </a:spcBef>
-              <a:spcAft>
-                <a:spcPct val="0"/>
-              </a:spcAft>
-              <a:buClrTx/>
-              <a:buSzTx/>
-              <a:buFontTx/>
-              <a:buNone/>
-              <a:tabLst/>
-            </a:pPr>
-            <a:r>
-              <a:rPr kumimoji="0" lang="en-US" altLang="en-US" sz="1100" b="1" i="0" u="none" strike="noStrike" cap="none" normalizeH="0" baseline="0" dirty="0">
-                <a:ln>
-                  <a:noFill/>
-                </a:ln>
-                <a:effectLst/>
-                <a:latin typeface="Segoe UI" panose="020B0502040204020203" pitchFamily="34" charset="0"/>
-                <a:ea typeface="Calibri" panose="020F0502020204030204" pitchFamily="34" charset="0"/>
-                <a:cs typeface="Segoe UI" panose="020B0502040204020203" pitchFamily="34" charset="0"/>
-              </a:rPr>
-              <a:t> </a:t>
-            </a:r>
-            <a:br>
-              <a:rPr kumimoji="0" lang="en-US" altLang="en-US" sz="2800" b="1" i="0" u="none" strike="noStrike" cap="none" normalizeH="0" baseline="0" dirty="0">
-                <a:ln>
-                  <a:noFill/>
-                </a:ln>
-                <a:effectLst/>
-                <a:latin typeface="Segoe UI" panose="020B0502040204020203" pitchFamily="34" charset="0"/>
-                <a:ea typeface="Calibri" panose="020F0502020204030204" pitchFamily="34" charset="0"/>
-                <a:cs typeface="Segoe UI" panose="020B0502040204020203" pitchFamily="34" charset="0"/>
-              </a:rPr>
-            </a:br>
-            <a:r>
-              <a:rPr kumimoji="0" lang="en-US" altLang="en-US" sz="2800" b="0" i="0" u="none" strike="noStrike" cap="none" normalizeH="0" baseline="0" dirty="0">
-                <a:ln>
-                  <a:noFill/>
-                </a:ln>
-                <a:effectLst/>
-                <a:latin typeface="Segoe UI" panose="020B0502040204020203" pitchFamily="34" charset="0"/>
-                <a:ea typeface="Calibri" panose="020F0502020204030204" pitchFamily="34" charset="0"/>
-                <a:cs typeface="Segoe UI" panose="020B0502040204020203" pitchFamily="34" charset="0"/>
-              </a:rPr>
-              <a:t>Total Annual Savings over Existing Architecture: </a:t>
-            </a:r>
-            <a:r>
-              <a:rPr kumimoji="0" lang="en-US" altLang="en-US" sz="3600" b="1" i="0" u="none" strike="noStrike" cap="none" normalizeH="0" baseline="0" dirty="0">
-                <a:ln>
-                  <a:noFill/>
-                </a:ln>
-                <a:solidFill>
-                  <a:srgbClr val="92D050"/>
-                </a:solidFill>
-                <a:effectLst/>
-                <a:latin typeface="Segoe UI" panose="020B0502040204020203" pitchFamily="34" charset="0"/>
-                <a:ea typeface="Calibri" panose="020F0502020204030204" pitchFamily="34" charset="0"/>
-                <a:cs typeface="Segoe UI" panose="020B0502040204020203" pitchFamily="34" charset="0"/>
-              </a:rPr>
-              <a:t>$</a:t>
-            </a:r>
-            <a:r>
-              <a:rPr lang="en-US" altLang="en-US" sz="3600" b="1" dirty="0">
-                <a:solidFill>
-                  <a:srgbClr val="92D050"/>
-                </a:solidFill>
-                <a:latin typeface="Segoe UI" panose="020B0502040204020203" pitchFamily="34" charset="0"/>
-                <a:ea typeface="Calibri" panose="020F0502020204030204" pitchFamily="34" charset="0"/>
-                <a:cs typeface="Segoe UI" panose="020B0502040204020203" pitchFamily="34" charset="0"/>
-              </a:rPr>
-              <a:t>40</a:t>
-            </a:r>
-            <a:r>
-              <a:rPr kumimoji="0" lang="en-US" altLang="en-US" sz="3600" b="1" i="0" u="none" strike="noStrike" cap="none" normalizeH="0" baseline="0" dirty="0">
-                <a:ln>
-                  <a:noFill/>
-                </a:ln>
-                <a:solidFill>
-                  <a:srgbClr val="92D050"/>
-                </a:solidFill>
-                <a:effectLst/>
-                <a:latin typeface="Segoe UI" panose="020B0502040204020203" pitchFamily="34" charset="0"/>
-                <a:ea typeface="Calibri" panose="020F0502020204030204" pitchFamily="34" charset="0"/>
-                <a:cs typeface="Segoe UI" panose="020B0502040204020203" pitchFamily="34" charset="0"/>
-              </a:rPr>
-              <a:t>,704</a:t>
-            </a:r>
-          </a:p>
-        </p:txBody>
-      </p:sp>
       <p:graphicFrame>
         <p:nvGraphicFramePr>
           <p:cNvPr id="4" name="Table 3">
@@ -19875,6 +19636,245 @@
           </a:graphicData>
         </a:graphic>
       </p:graphicFrame>
+      <p:sp>
+        <p:nvSpPr>
+          <p:cNvPr id="5" name="Rectangle 1">
+            <a:extLst>
+              <a:ext uri="{FF2B5EF4-FFF2-40B4-BE49-F238E27FC236}">
+                <a16:creationId xmlns:a16="http://schemas.microsoft.com/office/drawing/2014/main" id="{B2F351FC-6B91-437D-8B5D-A5FDA233EDE5}"/>
+              </a:ext>
+            </a:extLst>
+          </p:cNvPr>
+          <p:cNvSpPr>
+            <a:spLocks noChangeArrowheads="1"/>
+          </p:cNvSpPr>
+          <p:nvPr/>
+        </p:nvSpPr>
+        <p:spPr bwMode="auto">
+          <a:xfrm>
+            <a:off x="690114" y="5131901"/>
+            <a:ext cx="9445086" cy="1523494"/>
+          </a:xfrm>
+          <a:prstGeom prst="rect">
+            <a:avLst/>
+          </a:prstGeom>
+          <a:noFill/>
+          <a:ln>
+            <a:noFill/>
+          </a:ln>
+          <a:effectLst/>
+          <a:extLst>
+            <a:ext uri="{909E8E84-426E-40DD-AFC4-6F175D3DCCD1}">
+              <a14:hiddenFill xmlns:a14="http://schemas.microsoft.com/office/drawing/2010/main">
+                <a:solidFill>
+                  <a:schemeClr val="accent1"/>
+                </a:solidFill>
+              </a14:hiddenFill>
+            </a:ext>
+            <a:ext uri="{91240B29-F687-4F45-9708-019B960494DF}">
+              <a14:hiddenLine xmlns:a14="http://schemas.microsoft.com/office/drawing/2010/main" w="9525">
+                <a:solidFill>
+                  <a:schemeClr val="tx1"/>
+                </a:solidFill>
+                <a:miter lim="800000"/>
+                <a:headEnd/>
+                <a:tailEnd/>
+              </a14:hiddenLine>
+            </a:ext>
+            <a:ext uri="{AF507438-7753-43E0-B8FC-AC1667EBCBE1}">
+              <a14:hiddenEffects xmlns:a14="http://schemas.microsoft.com/office/drawing/2010/main">
+                <a:effectLst>
+                  <a:outerShdw dist="35921" dir="2700000" algn="ctr" rotWithShape="0">
+                    <a:schemeClr val="bg2"/>
+                  </a:outerShdw>
+                </a:effectLst>
+              </a14:hiddenEffects>
+            </a:ext>
+          </a:extLst>
+        </p:spPr>
+        <p:txBody>
+          <a:bodyPr vert="horz" wrap="none" lIns="91440" tIns="45720" rIns="91440" bIns="45720" numCol="1" anchor="ctr" anchorCtr="0" compatLnSpc="1">
+            <a:prstTxWarp prst="textNoShape">
+              <a:avLst/>
+            </a:prstTxWarp>
+            <a:spAutoFit/>
+          </a:bodyPr>
+          <a:lstStyle/>
+          <a:p>
+            <a:pPr eaLnBrk="0" fontAlgn="base" hangingPunct="0">
+              <a:spcBef>
+                <a:spcPct val="0"/>
+              </a:spcBef>
+              <a:spcAft>
+                <a:spcPct val="0"/>
+              </a:spcAft>
+            </a:pPr>
+            <a:r>
+              <a:rPr lang="en-US" altLang="en-US" dirty="0">
+                <a:latin typeface="Segoe UI" panose="020B0502040204020203" pitchFamily="34" charset="0"/>
+                <a:cs typeface="Segoe UI" panose="020B0502040204020203" pitchFamily="34" charset="0"/>
+              </a:rPr>
+              <a:t>Existing Architecture (Current) Monthly Cost: $6,902</a:t>
+            </a:r>
+            <a:endParaRPr lang="en-US" altLang="en-US" dirty="0">
+              <a:latin typeface="Arial" panose="020B0604020202020204" pitchFamily="34" charset="0"/>
+            </a:endParaRPr>
+          </a:p>
+          <a:p>
+            <a:pPr marL="0" marR="0" lvl="0" indent="0" algn="l" defTabSz="914400" rtl="0" eaLnBrk="0" fontAlgn="base" latinLnBrk="0" hangingPunct="0">
+              <a:lnSpc>
+                <a:spcPct val="100000"/>
+              </a:lnSpc>
+              <a:spcBef>
+                <a:spcPct val="0"/>
+              </a:spcBef>
+              <a:spcAft>
+                <a:spcPct val="0"/>
+              </a:spcAft>
+              <a:buClrTx/>
+              <a:buSzTx/>
+              <a:buFontTx/>
+              <a:buNone/>
+              <a:tabLst/>
+            </a:pPr>
+            <a:r>
+              <a:rPr kumimoji="0" lang="en-US" altLang="en-US" sz="2800" b="0" i="0" u="none" strike="noStrike" cap="none" normalizeH="0" baseline="0" dirty="0">
+                <a:ln>
+                  <a:noFill/>
+                </a:ln>
+                <a:effectLst/>
+                <a:latin typeface="Segoe UI" panose="020B0502040204020203" pitchFamily="34" charset="0"/>
+                <a:ea typeface="Calibri" panose="020F0502020204030204" pitchFamily="34" charset="0"/>
+                <a:cs typeface="Segoe UI" panose="020B0502040204020203" pitchFamily="34" charset="0"/>
+              </a:rPr>
+              <a:t>Total Monthly Savings over Existing Architecture: </a:t>
+            </a:r>
+            <a:r>
+              <a:rPr kumimoji="0" lang="en-US" altLang="en-US" sz="2800" b="1" i="0" u="none" strike="noStrike" cap="none" normalizeH="0" baseline="0" dirty="0">
+                <a:ln>
+                  <a:noFill/>
+                </a:ln>
+                <a:effectLst/>
+                <a:latin typeface="Segoe UI" panose="020B0502040204020203" pitchFamily="34" charset="0"/>
+                <a:ea typeface="Calibri" panose="020F0502020204030204" pitchFamily="34" charset="0"/>
+                <a:cs typeface="Segoe UI" panose="020B0502040204020203" pitchFamily="34" charset="0"/>
+              </a:rPr>
+              <a:t>$3</a:t>
+            </a:r>
+            <a:r>
+              <a:rPr lang="en-US" altLang="en-US" sz="2800" b="1" dirty="0">
+                <a:latin typeface="Segoe UI" panose="020B0502040204020203" pitchFamily="34" charset="0"/>
+                <a:ea typeface="Calibri" panose="020F0502020204030204" pitchFamily="34" charset="0"/>
+                <a:cs typeface="Segoe UI" panose="020B0502040204020203" pitchFamily="34" charset="0"/>
+              </a:rPr>
+              <a:t>,392</a:t>
+            </a:r>
+            <a:endParaRPr kumimoji="0" lang="en-US" altLang="en-US" sz="2800" b="1" i="0" u="none" strike="noStrike" cap="none" normalizeH="0" baseline="0" dirty="0">
+              <a:ln>
+                <a:noFill/>
+              </a:ln>
+              <a:effectLst/>
+              <a:latin typeface="Segoe UI" panose="020B0502040204020203" pitchFamily="34" charset="0"/>
+              <a:ea typeface="Calibri" panose="020F0502020204030204" pitchFamily="34" charset="0"/>
+              <a:cs typeface="Segoe UI" panose="020B0502040204020203" pitchFamily="34" charset="0"/>
+            </a:endParaRPr>
+          </a:p>
+          <a:p>
+            <a:pPr marL="0" marR="0" lvl="0" indent="0" algn="l" defTabSz="914400" rtl="0" eaLnBrk="0" fontAlgn="base" latinLnBrk="0" hangingPunct="0">
+              <a:lnSpc>
+                <a:spcPct val="100000"/>
+              </a:lnSpc>
+              <a:spcBef>
+                <a:spcPct val="0"/>
+              </a:spcBef>
+              <a:spcAft>
+                <a:spcPct val="0"/>
+              </a:spcAft>
+              <a:buClrTx/>
+              <a:buSzTx/>
+              <a:buFontTx/>
+              <a:buNone/>
+              <a:tabLst/>
+            </a:pPr>
+            <a:r>
+              <a:rPr kumimoji="0" lang="en-US" altLang="en-US" sz="1100" b="1" i="0" u="none" strike="noStrike" cap="none" normalizeH="0" baseline="0" dirty="0">
+                <a:ln>
+                  <a:noFill/>
+                </a:ln>
+                <a:effectLst/>
+                <a:latin typeface="Segoe UI" panose="020B0502040204020203" pitchFamily="34" charset="0"/>
+                <a:ea typeface="Calibri" panose="020F0502020204030204" pitchFamily="34" charset="0"/>
+                <a:cs typeface="Segoe UI" panose="020B0502040204020203" pitchFamily="34" charset="0"/>
+              </a:rPr>
+              <a:t> </a:t>
+            </a:r>
+            <a:br>
+              <a:rPr kumimoji="0" lang="en-US" altLang="en-US" sz="2800" b="1" i="0" u="none" strike="noStrike" cap="none" normalizeH="0" baseline="0" dirty="0">
+                <a:ln>
+                  <a:noFill/>
+                </a:ln>
+                <a:effectLst/>
+                <a:latin typeface="Segoe UI" panose="020B0502040204020203" pitchFamily="34" charset="0"/>
+                <a:ea typeface="Calibri" panose="020F0502020204030204" pitchFamily="34" charset="0"/>
+                <a:cs typeface="Segoe UI" panose="020B0502040204020203" pitchFamily="34" charset="0"/>
+              </a:rPr>
+            </a:br>
+            <a:r>
+              <a:rPr kumimoji="0" lang="en-US" altLang="en-US" sz="2800" b="0" i="0" u="none" strike="noStrike" cap="none" normalizeH="0" baseline="0" dirty="0">
+                <a:ln>
+                  <a:noFill/>
+                </a:ln>
+                <a:effectLst/>
+                <a:latin typeface="Segoe UI" panose="020B0502040204020203" pitchFamily="34" charset="0"/>
+                <a:ea typeface="Calibri" panose="020F0502020204030204" pitchFamily="34" charset="0"/>
+                <a:cs typeface="Segoe UI" panose="020B0502040204020203" pitchFamily="34" charset="0"/>
+              </a:rPr>
+              <a:t>Total Annual Savings over Existing Architecture: </a:t>
+            </a:r>
+            <a:r>
+              <a:rPr kumimoji="0" lang="en-US" altLang="en-US" sz="3600" b="1" i="0" u="none" strike="noStrike" cap="none" normalizeH="0" baseline="0" dirty="0">
+                <a:ln>
+                  <a:noFill/>
+                </a:ln>
+                <a:solidFill>
+                  <a:srgbClr val="92D050"/>
+                </a:solidFill>
+                <a:effectLst/>
+                <a:latin typeface="Segoe UI" panose="020B0502040204020203" pitchFamily="34" charset="0"/>
+                <a:ea typeface="Calibri" panose="020F0502020204030204" pitchFamily="34" charset="0"/>
+                <a:cs typeface="Segoe UI" panose="020B0502040204020203" pitchFamily="34" charset="0"/>
+              </a:rPr>
+              <a:t>$</a:t>
+            </a:r>
+            <a:r>
+              <a:rPr lang="en-US" altLang="en-US" sz="3600" b="1" dirty="0">
+                <a:solidFill>
+                  <a:srgbClr val="92D050"/>
+                </a:solidFill>
+                <a:latin typeface="Segoe UI" panose="020B0502040204020203" pitchFamily="34" charset="0"/>
+                <a:ea typeface="Calibri" panose="020F0502020204030204" pitchFamily="34" charset="0"/>
+                <a:cs typeface="Segoe UI" panose="020B0502040204020203" pitchFamily="34" charset="0"/>
+              </a:rPr>
+              <a:t>40</a:t>
+            </a:r>
+            <a:r>
+              <a:rPr kumimoji="0" lang="en-US" altLang="en-US" sz="3600" b="1" i="0" u="none" strike="noStrike" cap="none" normalizeH="0" baseline="0" dirty="0">
+                <a:ln>
+                  <a:noFill/>
+                </a:ln>
+                <a:solidFill>
+                  <a:srgbClr val="92D050"/>
+                </a:solidFill>
+                <a:effectLst/>
+                <a:latin typeface="Segoe UI" panose="020B0502040204020203" pitchFamily="34" charset="0"/>
+                <a:ea typeface="Calibri" panose="020F0502020204030204" pitchFamily="34" charset="0"/>
+                <a:cs typeface="Segoe UI" panose="020B0502040204020203" pitchFamily="34" charset="0"/>
+              </a:rPr>
+              <a:t>,704</a:t>
+            </a:r>
+          </a:p>
+        </p:txBody>
+      </p:sp>
     </p:spTree>
     <p:extLst>
       <p:ext uri="{BB962C8B-B14F-4D97-AF65-F5344CB8AC3E}">
@@ -19968,6 +19968,36 @@
           </a:p>
         </p:txBody>
       </p:sp>
+      <p:pic>
+        <p:nvPicPr>
+          <p:cNvPr id="3" name="Picture 2" descr="Costs are struck through&#10;&#10;The costs column in the table are show with a red strike through line to demonstrate that the costs do not apply and will be lower with Reserved instance">
+            <a:extLst>
+              <a:ext uri="{FF2B5EF4-FFF2-40B4-BE49-F238E27FC236}">
+                <a16:creationId xmlns:a16="http://schemas.microsoft.com/office/drawing/2014/main" id="{BDCD9A9C-557C-4F2F-BFE9-2917218E9275}"/>
+              </a:ext>
+            </a:extLst>
+          </p:cNvPr>
+          <p:cNvPicPr>
+            <a:picLocks noChangeAspect="1"/>
+          </p:cNvPicPr>
+          <p:nvPr/>
+        </p:nvPicPr>
+        <p:blipFill>
+          <a:blip r:embed="rId3"/>
+          <a:stretch>
+            <a:fillRect/>
+          </a:stretch>
+        </p:blipFill>
+        <p:spPr>
+          <a:xfrm>
+            <a:off x="517898" y="1542890"/>
+            <a:ext cx="10796952" cy="4925995"/>
+          </a:xfrm>
+          <a:prstGeom prst="rect">
+            <a:avLst/>
+          </a:prstGeom>
+        </p:spPr>
+      </p:pic>
       <p:sp>
         <p:nvSpPr>
           <p:cNvPr id="5" name="Rectangle 1">
@@ -20213,36 +20243,6 @@
           </a:p>
         </p:txBody>
       </p:sp>
-      <p:pic>
-        <p:nvPicPr>
-          <p:cNvPr id="3" name="Picture 2" descr="Costs are struck through&#10;&#10;The costs column in the table are show with a red strike through line to demonstrate that the costs do not apply and will be lower with Reserved instance">
-            <a:extLst>
-              <a:ext uri="{FF2B5EF4-FFF2-40B4-BE49-F238E27FC236}">
-                <a16:creationId xmlns:a16="http://schemas.microsoft.com/office/drawing/2014/main" id="{BDCD9A9C-557C-4F2F-BFE9-2917218E9275}"/>
-              </a:ext>
-            </a:extLst>
-          </p:cNvPr>
-          <p:cNvPicPr>
-            <a:picLocks noChangeAspect="1"/>
-          </p:cNvPicPr>
-          <p:nvPr/>
-        </p:nvPicPr>
-        <p:blipFill>
-          <a:blip r:embed="rId3"/>
-          <a:stretch>
-            <a:fillRect/>
-          </a:stretch>
-        </p:blipFill>
-        <p:spPr>
-          <a:xfrm>
-            <a:off x="517898" y="1542890"/>
-            <a:ext cx="10796952" cy="4925995"/>
-          </a:xfrm>
-          <a:prstGeom prst="rect">
-            <a:avLst/>
-          </a:prstGeom>
-        </p:spPr>
-      </p:pic>
     </p:spTree>
     <p:extLst>
       <p:ext uri="{BB962C8B-B14F-4D97-AF65-F5344CB8AC3E}">
@@ -21702,168 +21702,6 @@
               <a:solidFill>
                 <a:schemeClr val="tx1"/>
               </a:solidFill>
-            </a:endParaRPr>
-          </a:p>
-        </p:txBody>
-      </p:sp>
-      <p:sp>
-        <p:nvSpPr>
-          <p:cNvPr id="7" name="Rectangle 1">
-            <a:extLst>
-              <a:ext uri="{FF2B5EF4-FFF2-40B4-BE49-F238E27FC236}">
-                <a16:creationId xmlns:a16="http://schemas.microsoft.com/office/drawing/2014/main" id="{25DED2E1-B308-454F-B180-B71F34527133}"/>
-              </a:ext>
-            </a:extLst>
-          </p:cNvPr>
-          <p:cNvSpPr>
-            <a:spLocks noChangeArrowheads="1"/>
-          </p:cNvSpPr>
-          <p:nvPr/>
-        </p:nvSpPr>
-        <p:spPr bwMode="auto">
-          <a:xfrm>
-            <a:off x="692431" y="5137119"/>
-            <a:ext cx="9445086" cy="1523494"/>
-          </a:xfrm>
-          <a:prstGeom prst="rect">
-            <a:avLst/>
-          </a:prstGeom>
-          <a:noFill/>
-          <a:ln>
-            <a:noFill/>
-          </a:ln>
-          <a:effectLst/>
-          <a:extLst>
-            <a:ext uri="{909E8E84-426E-40DD-AFC4-6F175D3DCCD1}">
-              <a14:hiddenFill xmlns:a14="http://schemas.microsoft.com/office/drawing/2010/main">
-                <a:solidFill>
-                  <a:schemeClr val="accent1"/>
-                </a:solidFill>
-              </a14:hiddenFill>
-            </a:ext>
-            <a:ext uri="{91240B29-F687-4F45-9708-019B960494DF}">
-              <a14:hiddenLine xmlns:a14="http://schemas.microsoft.com/office/drawing/2010/main" w="9525">
-                <a:solidFill>
-                  <a:schemeClr val="tx1"/>
-                </a:solidFill>
-                <a:miter lim="800000"/>
-                <a:headEnd/>
-                <a:tailEnd/>
-              </a14:hiddenLine>
-            </a:ext>
-            <a:ext uri="{AF507438-7753-43E0-B8FC-AC1667EBCBE1}">
-              <a14:hiddenEffects xmlns:a14="http://schemas.microsoft.com/office/drawing/2010/main">
-                <a:effectLst>
-                  <a:outerShdw dist="35921" dir="2700000" algn="ctr" rotWithShape="0">
-                    <a:schemeClr val="bg2"/>
-                  </a:outerShdw>
-                </a:effectLst>
-              </a14:hiddenEffects>
-            </a:ext>
-          </a:extLst>
-        </p:spPr>
-        <p:txBody>
-          <a:bodyPr vert="horz" wrap="none" lIns="91440" tIns="45720" rIns="91440" bIns="45720" numCol="1" anchor="ctr" anchorCtr="0" compatLnSpc="1">
-            <a:prstTxWarp prst="textNoShape">
-              <a:avLst/>
-            </a:prstTxWarp>
-            <a:spAutoFit/>
-          </a:bodyPr>
-          <a:lstStyle/>
-          <a:p>
-            <a:pPr eaLnBrk="0" fontAlgn="base" hangingPunct="0">
-              <a:spcBef>
-                <a:spcPct val="0"/>
-              </a:spcBef>
-              <a:spcAft>
-                <a:spcPct val="0"/>
-              </a:spcAft>
-            </a:pPr>
-            <a:r>
-              <a:rPr lang="en-US" altLang="en-US" dirty="0">
-                <a:latin typeface="Segoe UI" panose="020B0502040204020203" pitchFamily="34" charset="0"/>
-                <a:cs typeface="Segoe UI" panose="020B0502040204020203" pitchFamily="34" charset="0"/>
-              </a:rPr>
-              <a:t>Existing Architecture (Current) Monthly Cost: $6,902</a:t>
-            </a:r>
-            <a:endParaRPr lang="en-US" altLang="en-US" dirty="0">
-              <a:latin typeface="Arial" panose="020B0604020202020204" pitchFamily="34" charset="0"/>
-            </a:endParaRPr>
-          </a:p>
-          <a:p>
-            <a:pPr lvl="0" eaLnBrk="0" fontAlgn="base" hangingPunct="0">
-              <a:spcBef>
-                <a:spcPct val="0"/>
-              </a:spcBef>
-              <a:spcAft>
-                <a:spcPct val="0"/>
-              </a:spcAft>
-            </a:pPr>
-            <a:r>
-              <a:rPr lang="en-US" altLang="en-US" sz="2800" dirty="0">
-                <a:latin typeface="Segoe UI" panose="020B0502040204020203" pitchFamily="34" charset="0"/>
-                <a:ea typeface="Calibri" panose="020F0502020204030204" pitchFamily="34" charset="0"/>
-                <a:cs typeface="Segoe UI" panose="020B0502040204020203" pitchFamily="34" charset="0"/>
-              </a:rPr>
-              <a:t>Total Monthly Savings over Existing Architecture: </a:t>
-            </a:r>
-            <a:r>
-              <a:rPr lang="en-US" altLang="en-US" sz="2800" b="1" dirty="0">
-                <a:latin typeface="Segoe UI" panose="020B0502040204020203" pitchFamily="34" charset="0"/>
-                <a:ea typeface="Calibri" panose="020F0502020204030204" pitchFamily="34" charset="0"/>
-                <a:cs typeface="Segoe UI" panose="020B0502040204020203" pitchFamily="34" charset="0"/>
-              </a:rPr>
-              <a:t>$3,320</a:t>
-            </a:r>
-          </a:p>
-          <a:p>
-            <a:pPr lvl="0" eaLnBrk="0" fontAlgn="base" hangingPunct="0">
-              <a:spcBef>
-                <a:spcPct val="0"/>
-              </a:spcBef>
-              <a:spcAft>
-                <a:spcPct val="0"/>
-              </a:spcAft>
-            </a:pPr>
-            <a:r>
-              <a:rPr lang="en-US" altLang="en-US" sz="1100" b="1" dirty="0">
-                <a:latin typeface="Segoe UI" panose="020B0502040204020203" pitchFamily="34" charset="0"/>
-                <a:ea typeface="Calibri" panose="020F0502020204030204" pitchFamily="34" charset="0"/>
-                <a:cs typeface="Segoe UI" panose="020B0502040204020203" pitchFamily="34" charset="0"/>
-              </a:rPr>
-              <a:t> </a:t>
-            </a:r>
-            <a:br>
-              <a:rPr lang="en-US" altLang="en-US" sz="2800" b="1" dirty="0">
-                <a:latin typeface="Segoe UI" panose="020B0502040204020203" pitchFamily="34" charset="0"/>
-                <a:ea typeface="Calibri" panose="020F0502020204030204" pitchFamily="34" charset="0"/>
-                <a:cs typeface="Segoe UI" panose="020B0502040204020203" pitchFamily="34" charset="0"/>
-              </a:rPr>
-            </a:br>
-            <a:r>
-              <a:rPr lang="en-US" altLang="en-US" sz="2800" dirty="0">
-                <a:latin typeface="Segoe UI" panose="020B0502040204020203" pitchFamily="34" charset="0"/>
-                <a:ea typeface="Calibri" panose="020F0502020204030204" pitchFamily="34" charset="0"/>
-                <a:cs typeface="Segoe UI" panose="020B0502040204020203" pitchFamily="34" charset="0"/>
-              </a:rPr>
-              <a:t>Total Annual Savings over Existing Architecture: </a:t>
-            </a:r>
-            <a:r>
-              <a:rPr lang="en-US" altLang="en-US" sz="3600" b="1" dirty="0">
-                <a:solidFill>
-                  <a:srgbClr val="92D050"/>
-                </a:solidFill>
-                <a:latin typeface="Segoe UI" panose="020B0502040204020203" pitchFamily="34" charset="0"/>
-                <a:ea typeface="Calibri" panose="020F0502020204030204" pitchFamily="34" charset="0"/>
-                <a:cs typeface="Segoe UI" panose="020B0502040204020203" pitchFamily="34" charset="0"/>
-              </a:rPr>
-              <a:t>$39,840</a:t>
-            </a:r>
-            <a:endParaRPr lang="en-US" altLang="en-US" sz="2800" dirty="0">
-              <a:solidFill>
-                <a:srgbClr val="92D050"/>
-              </a:solidFill>
-              <a:latin typeface="Arial" panose="020B0604020202020204" pitchFamily="34" charset="0"/>
             </a:endParaRPr>
           </a:p>
         </p:txBody>
@@ -22543,6 +22381,168 @@
           </a:graphicData>
         </a:graphic>
       </p:graphicFrame>
+      <p:sp>
+        <p:nvSpPr>
+          <p:cNvPr id="7" name="Rectangle 1">
+            <a:extLst>
+              <a:ext uri="{FF2B5EF4-FFF2-40B4-BE49-F238E27FC236}">
+                <a16:creationId xmlns:a16="http://schemas.microsoft.com/office/drawing/2014/main" id="{25DED2E1-B308-454F-B180-B71F34527133}"/>
+              </a:ext>
+            </a:extLst>
+          </p:cNvPr>
+          <p:cNvSpPr>
+            <a:spLocks noChangeArrowheads="1"/>
+          </p:cNvSpPr>
+          <p:nvPr/>
+        </p:nvSpPr>
+        <p:spPr bwMode="auto">
+          <a:xfrm>
+            <a:off x="692431" y="5137119"/>
+            <a:ext cx="9445086" cy="1523494"/>
+          </a:xfrm>
+          <a:prstGeom prst="rect">
+            <a:avLst/>
+          </a:prstGeom>
+          <a:noFill/>
+          <a:ln>
+            <a:noFill/>
+          </a:ln>
+          <a:effectLst/>
+          <a:extLst>
+            <a:ext uri="{909E8E84-426E-40DD-AFC4-6F175D3DCCD1}">
+              <a14:hiddenFill xmlns:a14="http://schemas.microsoft.com/office/drawing/2010/main">
+                <a:solidFill>
+                  <a:schemeClr val="accent1"/>
+                </a:solidFill>
+              </a14:hiddenFill>
+            </a:ext>
+            <a:ext uri="{91240B29-F687-4F45-9708-019B960494DF}">
+              <a14:hiddenLine xmlns:a14="http://schemas.microsoft.com/office/drawing/2010/main" w="9525">
+                <a:solidFill>
+                  <a:schemeClr val="tx1"/>
+                </a:solidFill>
+                <a:miter lim="800000"/>
+                <a:headEnd/>
+                <a:tailEnd/>
+              </a14:hiddenLine>
+            </a:ext>
+            <a:ext uri="{AF507438-7753-43E0-B8FC-AC1667EBCBE1}">
+              <a14:hiddenEffects xmlns:a14="http://schemas.microsoft.com/office/drawing/2010/main">
+                <a:effectLst>
+                  <a:outerShdw dist="35921" dir="2700000" algn="ctr" rotWithShape="0">
+                    <a:schemeClr val="bg2"/>
+                  </a:outerShdw>
+                </a:effectLst>
+              </a14:hiddenEffects>
+            </a:ext>
+          </a:extLst>
+        </p:spPr>
+        <p:txBody>
+          <a:bodyPr vert="horz" wrap="none" lIns="91440" tIns="45720" rIns="91440" bIns="45720" numCol="1" anchor="ctr" anchorCtr="0" compatLnSpc="1">
+            <a:prstTxWarp prst="textNoShape">
+              <a:avLst/>
+            </a:prstTxWarp>
+            <a:spAutoFit/>
+          </a:bodyPr>
+          <a:lstStyle/>
+          <a:p>
+            <a:pPr eaLnBrk="0" fontAlgn="base" hangingPunct="0">
+              <a:spcBef>
+                <a:spcPct val="0"/>
+              </a:spcBef>
+              <a:spcAft>
+                <a:spcPct val="0"/>
+              </a:spcAft>
+            </a:pPr>
+            <a:r>
+              <a:rPr lang="en-US" altLang="en-US" dirty="0">
+                <a:latin typeface="Segoe UI" panose="020B0502040204020203" pitchFamily="34" charset="0"/>
+                <a:cs typeface="Segoe UI" panose="020B0502040204020203" pitchFamily="34" charset="0"/>
+              </a:rPr>
+              <a:t>Existing Architecture (Current) Monthly Cost: $6,902</a:t>
+            </a:r>
+            <a:endParaRPr lang="en-US" altLang="en-US" dirty="0">
+              <a:latin typeface="Arial" panose="020B0604020202020204" pitchFamily="34" charset="0"/>
+            </a:endParaRPr>
+          </a:p>
+          <a:p>
+            <a:pPr lvl="0" eaLnBrk="0" fontAlgn="base" hangingPunct="0">
+              <a:spcBef>
+                <a:spcPct val="0"/>
+              </a:spcBef>
+              <a:spcAft>
+                <a:spcPct val="0"/>
+              </a:spcAft>
+            </a:pPr>
+            <a:r>
+              <a:rPr lang="en-US" altLang="en-US" sz="2800" dirty="0">
+                <a:latin typeface="Segoe UI" panose="020B0502040204020203" pitchFamily="34" charset="0"/>
+                <a:ea typeface="Calibri" panose="020F0502020204030204" pitchFamily="34" charset="0"/>
+                <a:cs typeface="Segoe UI" panose="020B0502040204020203" pitchFamily="34" charset="0"/>
+              </a:rPr>
+              <a:t>Total Monthly Savings over Existing Architecture: </a:t>
+            </a:r>
+            <a:r>
+              <a:rPr lang="en-US" altLang="en-US" sz="2800" b="1" dirty="0">
+                <a:latin typeface="Segoe UI" panose="020B0502040204020203" pitchFamily="34" charset="0"/>
+                <a:ea typeface="Calibri" panose="020F0502020204030204" pitchFamily="34" charset="0"/>
+                <a:cs typeface="Segoe UI" panose="020B0502040204020203" pitchFamily="34" charset="0"/>
+              </a:rPr>
+              <a:t>$3,320</a:t>
+            </a:r>
+          </a:p>
+          <a:p>
+            <a:pPr lvl="0" eaLnBrk="0" fontAlgn="base" hangingPunct="0">
+              <a:spcBef>
+                <a:spcPct val="0"/>
+              </a:spcBef>
+              <a:spcAft>
+                <a:spcPct val="0"/>
+              </a:spcAft>
+            </a:pPr>
+            <a:r>
+              <a:rPr lang="en-US" altLang="en-US" sz="1100" b="1" dirty="0">
+                <a:latin typeface="Segoe UI" panose="020B0502040204020203" pitchFamily="34" charset="0"/>
+                <a:ea typeface="Calibri" panose="020F0502020204030204" pitchFamily="34" charset="0"/>
+                <a:cs typeface="Segoe UI" panose="020B0502040204020203" pitchFamily="34" charset="0"/>
+              </a:rPr>
+              <a:t> </a:t>
+            </a:r>
+            <a:br>
+              <a:rPr lang="en-US" altLang="en-US" sz="2800" b="1" dirty="0">
+                <a:latin typeface="Segoe UI" panose="020B0502040204020203" pitchFamily="34" charset="0"/>
+                <a:ea typeface="Calibri" panose="020F0502020204030204" pitchFamily="34" charset="0"/>
+                <a:cs typeface="Segoe UI" panose="020B0502040204020203" pitchFamily="34" charset="0"/>
+              </a:rPr>
+            </a:br>
+            <a:r>
+              <a:rPr lang="en-US" altLang="en-US" sz="2800" dirty="0">
+                <a:latin typeface="Segoe UI" panose="020B0502040204020203" pitchFamily="34" charset="0"/>
+                <a:ea typeface="Calibri" panose="020F0502020204030204" pitchFamily="34" charset="0"/>
+                <a:cs typeface="Segoe UI" panose="020B0502040204020203" pitchFamily="34" charset="0"/>
+              </a:rPr>
+              <a:t>Total Annual Savings over Existing Architecture: </a:t>
+            </a:r>
+            <a:r>
+              <a:rPr lang="en-US" altLang="en-US" sz="3600" b="1" dirty="0">
+                <a:solidFill>
+                  <a:srgbClr val="92D050"/>
+                </a:solidFill>
+                <a:latin typeface="Segoe UI" panose="020B0502040204020203" pitchFamily="34" charset="0"/>
+                <a:ea typeface="Calibri" panose="020F0502020204030204" pitchFamily="34" charset="0"/>
+                <a:cs typeface="Segoe UI" panose="020B0502040204020203" pitchFamily="34" charset="0"/>
+              </a:rPr>
+              <a:t>$39,840</a:t>
+            </a:r>
+            <a:endParaRPr lang="en-US" altLang="en-US" sz="2800" dirty="0">
+              <a:solidFill>
+                <a:srgbClr val="92D050"/>
+              </a:solidFill>
+              <a:latin typeface="Arial" panose="020B0604020202020204" pitchFamily="34" charset="0"/>
+            </a:endParaRPr>
+          </a:p>
+        </p:txBody>
+      </p:sp>
     </p:spTree>
     <p:extLst>
       <p:ext uri="{BB962C8B-B14F-4D97-AF65-F5344CB8AC3E}">
@@ -25434,24 +25434,6 @@
 </file>
 
 <file path=customXml/item1.xml><?xml version="1.0" encoding="utf-8"?>
-<p:properties xmlns:p="http://schemas.microsoft.com/office/2006/metadata/properties" xmlns:xsi="http://www.w3.org/2001/XMLSchema-instance" xmlns:pc="http://schemas.microsoft.com/office/infopath/2007/PartnerControls">
-  <documentManagement>
-    <_ip_UnifiedCompliancePolicyUIAction xmlns="http://schemas.microsoft.com/sharepoint/v3" xsi:nil="true"/>
-    <_ip_UnifiedCompliancePolicyProperties xmlns="http://schemas.microsoft.com/sharepoint/v3" xsi:nil="true"/>
-  </documentManagement>
-</p:properties>
-</file>
-
-<file path=customXml/item2.xml><?xml version="1.0" encoding="utf-8"?>
-<?mso-contentType ?>
-<FormTemplates xmlns="http://schemas.microsoft.com/sharepoint/v3/contenttype/forms">
-  <Display>DocumentLibraryForm</Display>
-  <Edit>DocumentLibraryForm</Edit>
-  <New>DocumentLibraryForm</New>
-</FormTemplates>
-</file>
-
-<file path=customXml/item3.xml><?xml version="1.0" encoding="utf-8"?>
 <ct:contentTypeSchema xmlns:ct="http://schemas.microsoft.com/office/2006/metadata/contentType" xmlns:ma="http://schemas.microsoft.com/office/2006/metadata/properties/metaAttributes" ct:_="" ma:_="" ma:contentTypeName="Document" ma:contentTypeID="0x010100D15DFA3690A15B4081582BBCC6BEAC3E" ma:contentTypeVersion="9" ma:contentTypeDescription="Create a new document." ma:contentTypeScope="" ma:versionID="642da1784587cbe85a7fdbbe4dc36103">
   <xsd:schema xmlns:xsd="http://www.w3.org/2001/XMLSchema" xmlns:xs="http://www.w3.org/2001/XMLSchema" xmlns:p="http://schemas.microsoft.com/office/2006/metadata/properties" xmlns:ns1="http://schemas.microsoft.com/sharepoint/v3" xmlns:ns2="2023ac63-7b75-4916-a9ee-591457758eee" xmlns:ns3="d9c797ad-d7c3-4982-82b7-81352a75e4a5" targetNamespace="http://schemas.microsoft.com/office/2006/metadata/properties" ma:root="true" ma:fieldsID="91198b0246576053cc55dd2c67035a89" ns1:_="" ns2:_="" ns3:_="">
     <xsd:import namespace="http://schemas.microsoft.com/sharepoint/v3"/>
@@ -25653,33 +25635,25 @@
 </ct:contentTypeSchema>
 </file>
 
-<file path=customXml/itemProps1.xml><?xml version="1.0" encoding="utf-8"?>
-<ds:datastoreItem xmlns:ds="http://schemas.openxmlformats.org/officeDocument/2006/customXml" ds:itemID="{7B1BFBD9-A0FF-4D87-9FD7-EA7F33B51126}">
-  <ds:schemaRefs>
-    <ds:schemaRef ds:uri="http://schemas.microsoft.com/office/2006/documentManagement/types"/>
-    <ds:schemaRef ds:uri="http://schemas.openxmlformats.org/package/2006/metadata/core-properties"/>
-    <ds:schemaRef ds:uri="http://purl.org/dc/elements/1.1/"/>
-    <ds:schemaRef ds:uri="http://www.w3.org/XML/1998/namespace"/>
-    <ds:schemaRef ds:uri="2023ac63-7b75-4916-a9ee-591457758eee"/>
-    <ds:schemaRef ds:uri="http://schemas.microsoft.com/office/2006/metadata/properties"/>
-    <ds:schemaRef ds:uri="http://purl.org/dc/terms/"/>
-    <ds:schemaRef ds:uri="http://schemas.microsoft.com/sharepoint/v3"/>
-    <ds:schemaRef ds:uri="http://schemas.microsoft.com/office/infopath/2007/PartnerControls"/>
-    <ds:schemaRef ds:uri="d9c797ad-d7c3-4982-82b7-81352a75e4a5"/>
-    <ds:schemaRef ds:uri="http://purl.org/dc/dcmitype/"/>
-  </ds:schemaRefs>
-</ds:datastoreItem>
+<file path=customXml/item2.xml><?xml version="1.0" encoding="utf-8"?>
+<?mso-contentType ?>
+<FormTemplates xmlns="http://schemas.microsoft.com/sharepoint/v3/contenttype/forms">
+  <Display>DocumentLibraryForm</Display>
+  <Edit>DocumentLibraryForm</Edit>
+  <New>DocumentLibraryForm</New>
+</FormTemplates>
 </file>
 
-<file path=customXml/itemProps2.xml><?xml version="1.0" encoding="utf-8"?>
-<ds:datastoreItem xmlns:ds="http://schemas.openxmlformats.org/officeDocument/2006/customXml" ds:itemID="{54DD898F-E2DD-40B7-B3A4-1FF683F6B8B8}">
-  <ds:schemaRefs>
-    <ds:schemaRef ds:uri="http://schemas.microsoft.com/sharepoint/v3/contenttype/forms"/>
-  </ds:schemaRefs>
-</ds:datastoreItem>
+<file path=customXml/item3.xml><?xml version="1.0" encoding="utf-8"?>
+<p:properties xmlns:p="http://schemas.microsoft.com/office/2006/metadata/properties" xmlns:xsi="http://www.w3.org/2001/XMLSchema-instance" xmlns:pc="http://schemas.microsoft.com/office/infopath/2007/PartnerControls">
+  <documentManagement>
+    <_ip_UnifiedCompliancePolicyUIAction xmlns="http://schemas.microsoft.com/sharepoint/v3" xsi:nil="true"/>
+    <_ip_UnifiedCompliancePolicyProperties xmlns="http://schemas.microsoft.com/sharepoint/v3" xsi:nil="true"/>
+  </documentManagement>
+</p:properties>
 </file>
 
-<file path=customXml/itemProps3.xml><?xml version="1.0" encoding="utf-8"?>
+<file path=customXml/itemProps1.xml><?xml version="1.0" encoding="utf-8"?>
 <ds:datastoreItem xmlns:ds="http://schemas.openxmlformats.org/officeDocument/2006/customXml" ds:itemID="{65327A5B-FD20-40EE-A949-3806713D95E6}">
   <ds:schemaRefs>
     <ds:schemaRef ds:uri="http://schemas.microsoft.com/office/2006/metadata/contentType"/>
@@ -25697,4 +25671,30 @@
     <ds:schemaRef ds:uri="http://schemas.microsoft.com/internal/obd"/>
   </ds:schemaRefs>
 </ds:datastoreItem>
+</file>
+
+<file path=customXml/itemProps2.xml><?xml version="1.0" encoding="utf-8"?>
+<ds:datastoreItem xmlns:ds="http://schemas.openxmlformats.org/officeDocument/2006/customXml" ds:itemID="{54DD898F-E2DD-40B7-B3A4-1FF683F6B8B8}">
+  <ds:schemaRefs>
+    <ds:schemaRef ds:uri="http://schemas.microsoft.com/sharepoint/v3/contenttype/forms"/>
+  </ds:schemaRefs>
+</ds:datastoreItem>
+</file>
+
+<file path=customXml/itemProps3.xml><?xml version="1.0" encoding="utf-8"?>
+<ds:datastoreItem xmlns:ds="http://schemas.openxmlformats.org/officeDocument/2006/customXml" ds:itemID="{7B1BFBD9-A0FF-4D87-9FD7-EA7F33B51126}">
+  <ds:schemaRefs>
+    <ds:schemaRef ds:uri="http://schemas.microsoft.com/office/2006/documentManagement/types"/>
+    <ds:schemaRef ds:uri="http://schemas.openxmlformats.org/package/2006/metadata/core-properties"/>
+    <ds:schemaRef ds:uri="http://purl.org/dc/elements/1.1/"/>
+    <ds:schemaRef ds:uri="http://www.w3.org/XML/1998/namespace"/>
+    <ds:schemaRef ds:uri="2023ac63-7b75-4916-a9ee-591457758eee"/>
+    <ds:schemaRef ds:uri="http://schemas.microsoft.com/office/2006/metadata/properties"/>
+    <ds:schemaRef ds:uri="http://purl.org/dc/terms/"/>
+    <ds:schemaRef ds:uri="http://schemas.microsoft.com/sharepoint/v3"/>
+    <ds:schemaRef ds:uri="http://schemas.microsoft.com/office/infopath/2007/PartnerControls"/>
+    <ds:schemaRef ds:uri="d9c797ad-d7c3-4982-82b7-81352a75e4a5"/>
+    <ds:schemaRef ds:uri="http://purl.org/dc/dcmitype/"/>
+  </ds:schemaRefs>
+</ds:datastoreItem>
 </file>
</xml_diff>